<commit_message>
Changed presentation: added all slides
</commit_message>
<xml_diff>
--- a/Presentation/SwiftLint-Abrosov.pptx
+++ b/Presentation/SwiftLint-Abrosov.pptx
@@ -12,11 +12,13 @@
     <p:sldId id="262" r:id="rId6"/>
     <p:sldId id="263" r:id="rId7"/>
     <p:sldId id="266" r:id="rId8"/>
-    <p:sldId id="267" r:id="rId9"/>
-    <p:sldId id="264" r:id="rId10"/>
-    <p:sldId id="265" r:id="rId11"/>
-    <p:sldId id="260" r:id="rId12"/>
-    <p:sldId id="258" r:id="rId13"/>
+    <p:sldId id="264" r:id="rId9"/>
+    <p:sldId id="267" r:id="rId10"/>
+    <p:sldId id="268" r:id="rId11"/>
+    <p:sldId id="269" r:id="rId12"/>
+    <p:sldId id="265" r:id="rId13"/>
+    <p:sldId id="260" r:id="rId14"/>
+    <p:sldId id="258" r:id="rId15"/>
   </p:sldIdLst>
   <p:sldSz cx="12192000" cy="6858000"/>
   <p:notesSz cx="6858000" cy="9144000"/>
@@ -3081,7 +3083,7 @@
           <p:cNvPr id="2" name="Заголовок 1">
             <a:extLst>
               <a:ext uri="{FF2B5EF4-FFF2-40B4-BE49-F238E27FC236}">
-                <a16:creationId xmlns:a16="http://schemas.microsoft.com/office/drawing/2014/main" id="{31B897F7-0DCF-E745-B78C-D400FE6E3D18}"/>
+                <a16:creationId xmlns:a16="http://schemas.microsoft.com/office/drawing/2014/main" id="{88D065E4-8FA2-9648-8EE2-DF73CBFBB6AE}"/>
               </a:ext>
             </a:extLst>
           </p:cNvPr>
@@ -3098,13 +3100,19 @@
           <a:lstStyle/>
           <a:p>
             <a:r>
-              <a:rPr lang="ru-RU" dirty="0">
+              <a:rPr lang="ru-RU" b="1" i="0" u="none" strike="noStrike" dirty="0">
                 <a:solidFill>
                   <a:srgbClr val="7030A0"/>
                 </a:solidFill>
-              </a:rPr>
-              <a:t>Итог</a:t>
-            </a:r>
+                <a:effectLst/>
+              </a:rPr>
+              <a:t>Добавление своих правил</a:t>
+            </a:r>
+            <a:endParaRPr lang="ru-RU" dirty="0">
+              <a:solidFill>
+                <a:srgbClr val="7030A0"/>
+              </a:solidFill>
+            </a:endParaRPr>
           </a:p>
         </p:txBody>
       </p:sp>
@@ -3113,7 +3121,7 @@
           <p:cNvPr id="3" name="Объект 2">
             <a:extLst>
               <a:ext uri="{FF2B5EF4-FFF2-40B4-BE49-F238E27FC236}">
-                <a16:creationId xmlns:a16="http://schemas.microsoft.com/office/drawing/2014/main" id="{65F95F4C-C842-E64F-9E8C-3F671E7857A7}"/>
+                <a16:creationId xmlns:a16="http://schemas.microsoft.com/office/drawing/2014/main" id="{4A553313-DA16-BF4A-B49C-948CE0EB266C}"/>
               </a:ext>
             </a:extLst>
           </p:cNvPr>
@@ -3126,127 +3134,493 @@
         </p:nvSpPr>
         <p:spPr/>
         <p:txBody>
-          <a:bodyPr/>
+          <a:bodyPr>
+            <a:normAutofit fontScale="62500" lnSpcReduction="20000"/>
+          </a:bodyPr>
           <a:lstStyle/>
           <a:p>
-            <a:r>
-              <a:rPr lang="en-US" dirty="0" err="1">
-                <a:solidFill>
-                  <a:srgbClr val="FFFF00"/>
-                </a:solidFill>
+            <a:pPr algn="l">
+              <a:buFont typeface="Arial" panose="020B0604020202020204" pitchFamily="34" charset="0"/>
+              <a:buChar char="•"/>
+            </a:pPr>
+            <a:r>
+              <a:rPr lang="en" b="0" i="0" u="none" strike="noStrike" dirty="0" err="1">
+                <a:solidFill>
+                  <a:srgbClr val="111111"/>
+                </a:solidFill>
+                <a:effectLst/>
+                <a:latin typeface="-apple-system"/>
               </a:rPr>
               <a:t>SwiftLint</a:t>
             </a:r>
             <a:r>
-              <a:rPr lang="en-US" dirty="0">
-                <a:solidFill>
-                  <a:srgbClr val="FFFF00"/>
-                </a:solidFill>
+              <a:rPr lang="en" b="0" i="0" u="none" strike="noStrike" dirty="0">
+                <a:solidFill>
+                  <a:srgbClr val="111111"/>
+                </a:solidFill>
+                <a:effectLst/>
+                <a:latin typeface="-apple-system"/>
               </a:rPr>
               <a:t> </a:t>
             </a:r>
             <a:r>
-              <a:rPr lang="ru-RU" dirty="0">
-                <a:solidFill>
-                  <a:srgbClr val="FFFF00"/>
-                </a:solidFill>
-              </a:rPr>
-              <a:t>нужен</a:t>
-            </a:r>
-            <a:r>
+              <a:rPr lang="ru-RU" b="0" i="0" u="none" strike="noStrike" dirty="0">
+                <a:solidFill>
+                  <a:srgbClr val="111111"/>
+                </a:solidFill>
+                <a:effectLst/>
+                <a:latin typeface="-apple-system"/>
+              </a:rPr>
+              <a:t>позволяет добавлять свои правила на основе регулярных выражений. Для этого необходимо в файле .</a:t>
+            </a:r>
+            <a:r>
+              <a:rPr lang="en" b="0" i="0" u="none" strike="noStrike" dirty="0" err="1">
+                <a:solidFill>
+                  <a:srgbClr val="111111"/>
+                </a:solidFill>
+                <a:effectLst/>
+                <a:latin typeface="-apple-system"/>
+              </a:rPr>
+              <a:t>swiftlint.yml</a:t>
+            </a:r>
+            <a:r>
+              <a:rPr lang="en" b="0" i="0" u="none" strike="noStrike" dirty="0">
+                <a:solidFill>
+                  <a:srgbClr val="111111"/>
+                </a:solidFill>
+                <a:effectLst/>
+                <a:latin typeface="-apple-system"/>
+              </a:rPr>
+              <a:t> </a:t>
+            </a:r>
+            <a:r>
+              <a:rPr lang="ru-RU" b="0" i="0" u="none" strike="noStrike" dirty="0">
+                <a:solidFill>
+                  <a:srgbClr val="111111"/>
+                </a:solidFill>
+                <a:effectLst/>
+                <a:latin typeface="-apple-system"/>
+              </a:rPr>
+              <a:t>добавить секцию </a:t>
+            </a:r>
+            <a:r>
+              <a:rPr lang="en" b="0" i="0" u="none" strike="noStrike" dirty="0" err="1">
+                <a:solidFill>
+                  <a:srgbClr val="111111"/>
+                </a:solidFill>
+                <a:effectLst/>
+                <a:latin typeface="-apple-system"/>
+              </a:rPr>
+              <a:t>custom_rules</a:t>
+            </a:r>
+            <a:r>
+              <a:rPr lang="en" b="0" i="0" u="none" strike="noStrike" dirty="0">
+                <a:solidFill>
+                  <a:srgbClr val="111111"/>
+                </a:solidFill>
+                <a:effectLst/>
+                <a:latin typeface="-apple-system"/>
+              </a:rPr>
+              <a:t>. </a:t>
+            </a:r>
+            <a:r>
+              <a:rPr lang="ru-RU" b="0" i="0" u="none" strike="noStrike" dirty="0">
+                <a:solidFill>
+                  <a:srgbClr val="111111"/>
+                </a:solidFill>
+                <a:effectLst/>
+                <a:latin typeface="-apple-system"/>
+              </a:rPr>
+              <a:t>У правила можно указать следующие параметры:</a:t>
+            </a:r>
+            <a:br>
               <a:rPr lang="ru-RU" dirty="0"/>
-              <a:t> для того, чтобы</a:t>
-            </a:r>
-            <a:r>
-              <a:rPr lang="en-US" dirty="0"/>
-              <a:t>:</a:t>
-            </a:r>
-          </a:p>
-          <a:p>
-            <a:pPr marL="457200" lvl="1" indent="0">
-              <a:buNone/>
+            </a:br>
+            <a:br>
+              <a:rPr lang="ru-RU" dirty="0"/>
+            </a:br>
+            <a:r>
+              <a:rPr lang="en" b="0" i="0" u="none" strike="noStrike" dirty="0" err="1">
+                <a:solidFill>
+                  <a:srgbClr val="111111"/>
+                </a:solidFill>
+                <a:effectLst/>
+                <a:latin typeface="-apple-system"/>
+              </a:rPr>
+              <a:t>identifer</a:t>
+            </a:r>
+            <a:r>
+              <a:rPr lang="en" b="0" i="0" u="none" strike="noStrike" dirty="0">
+                <a:solidFill>
+                  <a:srgbClr val="111111"/>
+                </a:solidFill>
+                <a:effectLst/>
+                <a:latin typeface="-apple-system"/>
+              </a:rPr>
+              <a:t> — </a:t>
+            </a:r>
+            <a:r>
+              <a:rPr lang="ru-RU" b="0" i="0" u="none" strike="noStrike" dirty="0">
+                <a:solidFill>
+                  <a:srgbClr val="111111"/>
+                </a:solidFill>
+                <a:effectLst/>
+                <a:latin typeface="-apple-system"/>
+              </a:rPr>
+              <a:t>идентификатор (обязательно);</a:t>
+            </a:r>
+          </a:p>
+          <a:p>
+            <a:pPr algn="l">
+              <a:buFont typeface="Arial" panose="020B0604020202020204" pitchFamily="34" charset="0"/>
+              <a:buChar char="•"/>
             </a:pPr>
             <a:r>
-              <a:rPr lang="en-US" dirty="0"/>
-              <a:t>	1) </a:t>
-            </a:r>
-            <a:r>
-              <a:rPr lang="ru-RU" dirty="0">
-                <a:solidFill>
-                  <a:srgbClr val="FFFF00"/>
-                </a:solidFill>
-              </a:rPr>
-              <a:t>Тратить меньше времени на код-</a:t>
-            </a:r>
-            <a:r>
-              <a:rPr lang="ru-RU" dirty="0" err="1">
-                <a:solidFill>
-                  <a:srgbClr val="FFFF00"/>
-                </a:solidFill>
-              </a:rPr>
-              <a:t>ревью</a:t>
-            </a:r>
-            <a:r>
+              <a:rPr lang="en" b="0" i="0" u="none" strike="noStrike" dirty="0" err="1">
+                <a:solidFill>
+                  <a:srgbClr val="111111"/>
+                </a:solidFill>
+                <a:effectLst/>
+                <a:latin typeface="-apple-system"/>
+              </a:rPr>
+              <a:t>regexp</a:t>
+            </a:r>
+            <a:r>
+              <a:rPr lang="en" b="0" i="0" u="none" strike="noStrike" dirty="0">
+                <a:solidFill>
+                  <a:srgbClr val="111111"/>
+                </a:solidFill>
+                <a:effectLst/>
+                <a:latin typeface="-apple-system"/>
+              </a:rPr>
+              <a:t> — </a:t>
+            </a:r>
+            <a:r>
+              <a:rPr lang="ru-RU" b="0" i="0" u="none" strike="noStrike" dirty="0">
+                <a:solidFill>
+                  <a:srgbClr val="111111"/>
+                </a:solidFill>
+                <a:effectLst/>
+                <a:latin typeface="-apple-system"/>
+              </a:rPr>
+              <a:t>условие нахождения (обязательно);</a:t>
+            </a:r>
+          </a:p>
+          <a:p>
+            <a:pPr algn="l">
+              <a:buFont typeface="Arial" panose="020B0604020202020204" pitchFamily="34" charset="0"/>
+              <a:buChar char="•"/>
+            </a:pPr>
+            <a:r>
+              <a:rPr lang="en" b="0" i="0" u="none" strike="noStrike" dirty="0">
+                <a:solidFill>
+                  <a:srgbClr val="111111"/>
+                </a:solidFill>
+                <a:effectLst/>
+                <a:latin typeface="-apple-system"/>
+              </a:rPr>
+              <a:t>name — </a:t>
+            </a:r>
+            <a:r>
+              <a:rPr lang="ru-RU" b="0" i="0" u="none" strike="noStrike" dirty="0">
+                <a:solidFill>
+                  <a:srgbClr val="111111"/>
+                </a:solidFill>
+                <a:effectLst/>
+                <a:latin typeface="-apple-system"/>
+              </a:rPr>
+              <a:t>имя правила, отображается в тексте ошибки (необязательно);</a:t>
+            </a:r>
+          </a:p>
+          <a:p>
+            <a:pPr algn="l">
+              <a:buFont typeface="Arial" panose="020B0604020202020204" pitchFamily="34" charset="0"/>
+              <a:buChar char="•"/>
+            </a:pPr>
+            <a:r>
+              <a:rPr lang="en" b="0" i="0" u="none" strike="noStrike" dirty="0">
+                <a:solidFill>
+                  <a:srgbClr val="111111"/>
+                </a:solidFill>
+                <a:effectLst/>
+                <a:latin typeface="-apple-system"/>
+              </a:rPr>
+              <a:t>message — </a:t>
+            </a:r>
+            <a:r>
+              <a:rPr lang="ru-RU" b="0" i="0" u="none" strike="noStrike" dirty="0">
+                <a:solidFill>
+                  <a:srgbClr val="111111"/>
+                </a:solidFill>
+                <a:effectLst/>
+                <a:latin typeface="-apple-system"/>
+              </a:rPr>
+              <a:t>описание ошибки (обязательно);</a:t>
+            </a:r>
+          </a:p>
+          <a:p>
+            <a:pPr algn="l">
+              <a:buFont typeface="Arial" panose="020B0604020202020204" pitchFamily="34" charset="0"/>
+              <a:buChar char="•"/>
+            </a:pPr>
+            <a:r>
+              <a:rPr lang="en" b="0" i="0" u="none" strike="noStrike" dirty="0" err="1">
+                <a:solidFill>
+                  <a:srgbClr val="111111"/>
+                </a:solidFill>
+                <a:effectLst/>
+                <a:latin typeface="-apple-system"/>
+              </a:rPr>
+              <a:t>match_kinds</a:t>
+            </a:r>
+            <a:r>
+              <a:rPr lang="en" b="0" i="0" u="none" strike="noStrike" dirty="0">
+                <a:solidFill>
+                  <a:srgbClr val="111111"/>
+                </a:solidFill>
+                <a:effectLst/>
+                <a:latin typeface="-apple-system"/>
+              </a:rPr>
+              <a:t> — </a:t>
+            </a:r>
+            <a:r>
+              <a:rPr lang="ru-RU" b="0" i="0" u="none" strike="noStrike" dirty="0">
+                <a:solidFill>
+                  <a:srgbClr val="111111"/>
+                </a:solidFill>
+                <a:effectLst/>
+                <a:latin typeface="-apple-system"/>
+              </a:rPr>
+              <a:t>в каких сущностях искать вхождение, доступные значения (можно указывать несколько): </a:t>
+            </a:r>
+            <a:r>
+              <a:rPr lang="en" b="0" i="0" u="none" strike="noStrike" dirty="0">
+                <a:solidFill>
+                  <a:srgbClr val="111111"/>
+                </a:solidFill>
+                <a:effectLst/>
+                <a:latin typeface="-apple-system"/>
+              </a:rPr>
+              <a:t>comment, identifier, number, parameter, string, </a:t>
+            </a:r>
+            <a:r>
+              <a:rPr lang="ru-RU" b="0" i="0" u="none" strike="noStrike" dirty="0">
+                <a:solidFill>
+                  <a:srgbClr val="111111"/>
+                </a:solidFill>
+                <a:effectLst/>
+                <a:latin typeface="-apple-system"/>
+              </a:rPr>
+              <a:t>полный список доступен в документации (обязательно);</a:t>
+            </a:r>
+          </a:p>
+          <a:p>
+            <a:pPr algn="l">
+              <a:buFont typeface="Arial" panose="020B0604020202020204" pitchFamily="34" charset="0"/>
+              <a:buChar char="•"/>
+            </a:pPr>
+            <a:r>
+              <a:rPr lang="en" b="0" i="0" u="none" strike="noStrike" dirty="0">
+                <a:solidFill>
+                  <a:srgbClr val="111111"/>
+                </a:solidFill>
+                <a:effectLst/>
+                <a:latin typeface="-apple-system"/>
+              </a:rPr>
+              <a:t>severity — </a:t>
+            </a:r>
+            <a:r>
+              <a:rPr lang="ru-RU" b="0" i="0" u="none" strike="noStrike" dirty="0">
+                <a:solidFill>
+                  <a:srgbClr val="111111"/>
+                </a:solidFill>
+                <a:effectLst/>
+                <a:latin typeface="-apple-system"/>
+              </a:rPr>
+              <a:t>тип: предупреждение (</a:t>
+            </a:r>
+            <a:r>
+              <a:rPr lang="en" b="0" i="0" u="none" strike="noStrike" dirty="0">
+                <a:solidFill>
+                  <a:srgbClr val="111111"/>
+                </a:solidFill>
+                <a:effectLst/>
+                <a:latin typeface="-apple-system"/>
+              </a:rPr>
+              <a:t>warning) </a:t>
+            </a:r>
+            <a:r>
+              <a:rPr lang="ru-RU" b="0" i="0" u="none" strike="noStrike" dirty="0">
+                <a:solidFill>
+                  <a:srgbClr val="111111"/>
+                </a:solidFill>
+                <a:effectLst/>
+                <a:latin typeface="-apple-system"/>
+              </a:rPr>
+              <a:t>или ошибка (</a:t>
+            </a:r>
+            <a:r>
+              <a:rPr lang="en" b="0" i="0" u="none" strike="noStrike" dirty="0">
+                <a:solidFill>
+                  <a:srgbClr val="111111"/>
+                </a:solidFill>
+                <a:effectLst/>
+                <a:latin typeface="-apple-system"/>
+              </a:rPr>
+              <a:t>error) (</a:t>
+            </a:r>
+            <a:r>
+              <a:rPr lang="ru-RU" b="0" i="0" u="none" strike="noStrike" dirty="0">
+                <a:solidFill>
+                  <a:srgbClr val="111111"/>
+                </a:solidFill>
+                <a:effectLst/>
+                <a:latin typeface="-apple-system"/>
+              </a:rPr>
+              <a:t>необязательно, по умолчанию — </a:t>
+            </a:r>
+            <a:r>
+              <a:rPr lang="en" b="0" i="0" u="none" strike="noStrike" dirty="0">
+                <a:solidFill>
+                  <a:srgbClr val="111111"/>
+                </a:solidFill>
+                <a:effectLst/>
+                <a:latin typeface="-apple-system"/>
+              </a:rPr>
+              <a:t>warning);</a:t>
+            </a:r>
+          </a:p>
+          <a:p>
+            <a:pPr algn="l">
+              <a:buFont typeface="Arial" panose="020B0604020202020204" pitchFamily="34" charset="0"/>
+              <a:buChar char="•"/>
+            </a:pPr>
+            <a:r>
+              <a:rPr lang="en" b="0" i="0" u="none" strike="noStrike" dirty="0">
+                <a:solidFill>
+                  <a:srgbClr val="111111"/>
+                </a:solidFill>
+                <a:effectLst/>
+                <a:latin typeface="-apple-system"/>
+              </a:rPr>
+              <a:t>included — </a:t>
+            </a:r>
+            <a:r>
+              <a:rPr lang="ru-RU" b="0" i="0" u="none" strike="noStrike" dirty="0">
+                <a:solidFill>
+                  <a:srgbClr val="111111"/>
+                </a:solidFill>
+                <a:effectLst/>
+                <a:latin typeface="-apple-system"/>
+              </a:rPr>
+              <a:t>какие файлы необходимо проверять (необязательно</a:t>
+            </a:r>
+          </a:p>
+          <a:p>
+            <a:br>
               <a:rPr lang="ru-RU" dirty="0"/>
-              <a:t> при работе в команде, над объемными проектами</a:t>
-            </a:r>
-          </a:p>
-          <a:p>
-            <a:pPr marL="457200" lvl="1" indent="0">
-              <a:buNone/>
-            </a:pPr>
-            <a:r>
+            </a:br>
+            <a:r>
+              <a:rPr lang="ru-RU" b="0" i="0" u="none" strike="noStrike" dirty="0">
+                <a:solidFill>
+                  <a:srgbClr val="111111"/>
+                </a:solidFill>
+                <a:effectLst/>
+                <a:latin typeface="-apple-system"/>
+              </a:rPr>
+              <a:t>Правило, проверяющее именование с суффиксом -</a:t>
+            </a:r>
+            <a:r>
+              <a:rPr lang="en" b="0" i="0" u="none" strike="noStrike" dirty="0">
+                <a:solidFill>
+                  <a:srgbClr val="111111"/>
+                </a:solidFill>
+                <a:effectLst/>
+                <a:latin typeface="-apple-system"/>
+              </a:rPr>
+              <a:t>id. (</a:t>
+            </a:r>
+            <a:r>
+              <a:rPr lang="ru-RU" b="0" i="0" u="none" strike="noStrike" dirty="0">
+                <a:solidFill>
+                  <a:srgbClr val="111111"/>
+                </a:solidFill>
+                <a:effectLst/>
+                <a:latin typeface="-apple-system"/>
+              </a:rPr>
+              <a:t>например: </a:t>
+            </a:r>
+            <a:r>
+              <a:rPr lang="en" b="0" i="0" u="none" strike="noStrike" dirty="0" err="1">
+                <a:solidFill>
+                  <a:srgbClr val="111111"/>
+                </a:solidFill>
+                <a:effectLst/>
+                <a:latin typeface="-apple-system"/>
+              </a:rPr>
+              <a:t>userId</a:t>
+            </a:r>
+            <a:r>
+              <a:rPr lang="en" b="0" i="0" u="none" strike="noStrike" dirty="0">
+                <a:solidFill>
+                  <a:srgbClr val="111111"/>
+                </a:solidFill>
+                <a:effectLst/>
+                <a:latin typeface="-apple-system"/>
+              </a:rPr>
+              <a:t> — </a:t>
+            </a:r>
+            <a:r>
+              <a:rPr lang="ru-RU" b="0" i="0" u="none" strike="noStrike" dirty="0">
+                <a:solidFill>
+                  <a:srgbClr val="111111"/>
+                </a:solidFill>
+                <a:effectLst/>
+                <a:latin typeface="-apple-system"/>
+              </a:rPr>
+              <a:t>верно, </a:t>
+            </a:r>
+            <a:r>
+              <a:rPr lang="en" b="0" i="0" u="none" strike="noStrike" dirty="0" err="1">
+                <a:solidFill>
+                  <a:srgbClr val="111111"/>
+                </a:solidFill>
+                <a:effectLst/>
+                <a:latin typeface="-apple-system"/>
+              </a:rPr>
+              <a:t>userID</a:t>
+            </a:r>
+            <a:r>
+              <a:rPr lang="en" b="0" i="0" u="none" strike="noStrike" dirty="0">
+                <a:solidFill>
+                  <a:srgbClr val="111111"/>
+                </a:solidFill>
+                <a:effectLst/>
+                <a:latin typeface="-apple-system"/>
+              </a:rPr>
+              <a:t> — </a:t>
+            </a:r>
+            <a:r>
+              <a:rPr lang="ru-RU" b="0" i="0" u="none" strike="noStrike" dirty="0">
+                <a:solidFill>
+                  <a:srgbClr val="111111"/>
+                </a:solidFill>
+                <a:effectLst/>
+                <a:latin typeface="-apple-system"/>
+              </a:rPr>
+              <a:t>неверно): </a:t>
+            </a:r>
+            <a:br>
               <a:rPr lang="ru-RU" dirty="0"/>
-              <a:t>	2) </a:t>
-            </a:r>
-            <a:r>
-              <a:rPr lang="ru-RU" dirty="0">
-                <a:solidFill>
-                  <a:srgbClr val="FFFF00"/>
-                </a:solidFill>
-              </a:rPr>
-              <a:t>Придерживаться единого </a:t>
-            </a:r>
-            <a:r>
-              <a:rPr lang="en" dirty="0">
-                <a:solidFill>
-                  <a:srgbClr val="FFFF00"/>
-                </a:solidFill>
-              </a:rPr>
-              <a:t>Code Style</a:t>
-            </a:r>
-          </a:p>
-          <a:p>
-            <a:pPr marL="457200" lvl="1" indent="0">
-              <a:buNone/>
-            </a:pPr>
-            <a:r>
-              <a:rPr lang="en" dirty="0">
-                <a:solidFill>
-                  <a:srgbClr val="FFFF00"/>
-                </a:solidFill>
-              </a:rPr>
-              <a:t>	</a:t>
-            </a:r>
-            <a:r>
-              <a:rPr lang="en" dirty="0"/>
-              <a:t>3) </a:t>
-            </a:r>
-            <a:r>
-              <a:rPr lang="ru-RU" dirty="0">
-                <a:solidFill>
-                  <a:srgbClr val="FFFF00"/>
-                </a:solidFill>
-              </a:rPr>
-              <a:t>Повысить качество кода</a:t>
-            </a:r>
+            </a:br>
+            <a:endParaRPr lang="ru-RU" dirty="0"/>
           </a:p>
         </p:txBody>
       </p:sp>
     </p:spTree>
     <p:extLst>
       <p:ext uri="{BB962C8B-B14F-4D97-AF65-F5344CB8AC3E}">
-        <p14:creationId xmlns:p14="http://schemas.microsoft.com/office/powerpoint/2010/main" val="1600230655"/>
+        <p14:creationId xmlns:p14="http://schemas.microsoft.com/office/powerpoint/2010/main" val="1785468581"/>
       </p:ext>
     </p:extLst>
   </p:cSld>
@@ -3278,6 +3652,936 @@
           <p:cNvPr id="2" name="Заголовок 1">
             <a:extLst>
               <a:ext uri="{FF2B5EF4-FFF2-40B4-BE49-F238E27FC236}">
+                <a16:creationId xmlns:a16="http://schemas.microsoft.com/office/drawing/2014/main" id="{DA04DAD3-50AA-BB44-B41F-1CAF57E5EFA3}"/>
+              </a:ext>
+            </a:extLst>
+          </p:cNvPr>
+          <p:cNvSpPr>
+            <a:spLocks noGrp="1"/>
+          </p:cNvSpPr>
+          <p:nvPr>
+            <p:ph type="title"/>
+          </p:nvPr>
+        </p:nvSpPr>
+        <p:spPr/>
+        <p:txBody>
+          <a:bodyPr/>
+          <a:lstStyle/>
+          <a:p>
+            <a:r>
+              <a:rPr lang="ru-RU" b="1" i="0" u="none" strike="noStrike" dirty="0">
+                <a:solidFill>
+                  <a:srgbClr val="7030A0"/>
+                </a:solidFill>
+                <a:effectLst/>
+              </a:rPr>
+              <a:t>Скорость сборки проекта</a:t>
+            </a:r>
+            <a:endParaRPr lang="ru-RU" dirty="0">
+              <a:solidFill>
+                <a:srgbClr val="7030A0"/>
+              </a:solidFill>
+            </a:endParaRPr>
+          </a:p>
+        </p:txBody>
+      </p:sp>
+      <p:sp>
+        <p:nvSpPr>
+          <p:cNvPr id="3" name="Объект 2">
+            <a:extLst>
+              <a:ext uri="{FF2B5EF4-FFF2-40B4-BE49-F238E27FC236}">
+                <a16:creationId xmlns:a16="http://schemas.microsoft.com/office/drawing/2014/main" id="{27B34F77-AF9C-A748-B7D5-7DCE6941CA4B}"/>
+              </a:ext>
+            </a:extLst>
+          </p:cNvPr>
+          <p:cNvSpPr>
+            <a:spLocks noGrp="1"/>
+          </p:cNvSpPr>
+          <p:nvPr>
+            <p:ph idx="1"/>
+          </p:nvPr>
+        </p:nvSpPr>
+        <p:spPr>
+          <a:xfrm>
+            <a:off x="838200" y="1825624"/>
+            <a:ext cx="10515600" cy="4782993"/>
+          </a:xfrm>
+        </p:spPr>
+        <p:txBody>
+          <a:bodyPr>
+            <a:normAutofit lnSpcReduction="10000"/>
+          </a:bodyPr>
+          <a:lstStyle/>
+          <a:p>
+            <a:r>
+              <a:rPr lang="ru-RU" b="0" i="0" u="none" strike="noStrike" dirty="0">
+                <a:solidFill>
+                  <a:srgbClr val="FFFF00"/>
+                </a:solidFill>
+                <a:effectLst/>
+              </a:rPr>
+              <a:t>Очевидно, что использование </a:t>
+            </a:r>
+            <a:r>
+              <a:rPr lang="en" b="0" i="0" u="none" strike="noStrike" dirty="0" err="1">
+                <a:solidFill>
+                  <a:srgbClr val="FFFF00"/>
+                </a:solidFill>
+                <a:effectLst/>
+              </a:rPr>
+              <a:t>SwiftLint</a:t>
+            </a:r>
+            <a:r>
+              <a:rPr lang="en" b="0" i="0" u="none" strike="noStrike" dirty="0">
+                <a:solidFill>
+                  <a:srgbClr val="FFFF00"/>
+                </a:solidFill>
+                <a:effectLst/>
+              </a:rPr>
+              <a:t> </a:t>
+            </a:r>
+            <a:r>
+              <a:rPr lang="ru-RU" b="0" i="0" u="none" strike="noStrike" dirty="0">
+                <a:solidFill>
+                  <a:srgbClr val="FFFF00"/>
+                </a:solidFill>
+                <a:effectLst/>
+              </a:rPr>
+              <a:t>требует дополнительного времени при сборке проекта. Если скорость сборки заметно проседает, стоит задуматься о проверке только измененных файлов. Для этого нужно заменить скрипт проверки в </a:t>
+            </a:r>
+            <a:r>
+              <a:rPr lang="en" b="0" i="0" u="none" strike="noStrike" dirty="0">
+                <a:solidFill>
+                  <a:srgbClr val="FFFF00"/>
+                </a:solidFill>
+                <a:effectLst/>
+              </a:rPr>
+              <a:t>Build Phases </a:t>
+            </a:r>
+            <a:r>
+              <a:rPr lang="ru-RU" b="0" i="0" u="none" strike="noStrike" dirty="0">
+                <a:solidFill>
+                  <a:srgbClr val="FFFF00"/>
+                </a:solidFill>
+                <a:effectLst/>
+              </a:rPr>
+              <a:t>на:</a:t>
+            </a:r>
+          </a:p>
+          <a:p>
+            <a:pPr marL="457200" lvl="1" indent="0">
+              <a:buNone/>
+            </a:pPr>
+            <a:r>
+              <a:rPr lang="ru-RU" sz="1700" b="0" i="0" u="none" strike="noStrike" dirty="0">
+                <a:solidFill>
+                  <a:srgbClr val="00B0F0"/>
+                </a:solidFill>
+                <a:effectLst/>
+                <a:latin typeface="Menlo" panose="020B0609030804020204" pitchFamily="49" charset="0"/>
+              </a:rPr>
+              <a:t>	</a:t>
+            </a:r>
+            <a:r>
+              <a:rPr lang="en" sz="1400" b="0" i="0" u="none" strike="noStrike" dirty="0">
+                <a:solidFill>
+                  <a:srgbClr val="00B0F0"/>
+                </a:solidFill>
+                <a:effectLst/>
+                <a:latin typeface="Menlo" panose="020B0609030804020204" pitchFamily="49" charset="0"/>
+              </a:rPr>
+              <a:t>count=0 </a:t>
+            </a:r>
+            <a:endParaRPr lang="ru-RU" sz="1400" b="0" i="0" u="none" strike="noStrike" dirty="0">
+              <a:solidFill>
+                <a:srgbClr val="00B0F0"/>
+              </a:solidFill>
+              <a:effectLst/>
+              <a:latin typeface="Menlo" panose="020B0609030804020204" pitchFamily="49" charset="0"/>
+            </a:endParaRPr>
+          </a:p>
+          <a:p>
+            <a:pPr marL="914400" lvl="2" indent="0">
+              <a:buNone/>
+            </a:pPr>
+            <a:r>
+              <a:rPr lang="en" sz="1400" b="1" i="0" u="none" strike="noStrike" dirty="0">
+                <a:solidFill>
+                  <a:srgbClr val="00B0F0"/>
+                </a:solidFill>
+                <a:effectLst/>
+                <a:latin typeface="Menlo" panose="020B0609030804020204" pitchFamily="49" charset="0"/>
+              </a:rPr>
+              <a:t>for</a:t>
+            </a:r>
+            <a:r>
+              <a:rPr lang="en" sz="1400" b="0" i="0" u="none" strike="noStrike" dirty="0">
+                <a:solidFill>
+                  <a:srgbClr val="00B0F0"/>
+                </a:solidFill>
+                <a:effectLst/>
+                <a:latin typeface="Menlo" panose="020B0609030804020204" pitchFamily="49" charset="0"/>
+              </a:rPr>
+              <a:t> </a:t>
+            </a:r>
+            <a:r>
+              <a:rPr lang="en" sz="1400" b="0" i="0" u="none" strike="noStrike" dirty="0" err="1">
+                <a:solidFill>
+                  <a:srgbClr val="00B0F0"/>
+                </a:solidFill>
+                <a:effectLst/>
+                <a:latin typeface="Menlo" panose="020B0609030804020204" pitchFamily="49" charset="0"/>
+              </a:rPr>
+              <a:t>file_path</a:t>
+            </a:r>
+            <a:r>
+              <a:rPr lang="en" sz="1400" b="0" i="0" u="none" strike="noStrike" dirty="0">
+                <a:solidFill>
+                  <a:srgbClr val="00B0F0"/>
+                </a:solidFill>
+                <a:effectLst/>
+                <a:latin typeface="Menlo" panose="020B0609030804020204" pitchFamily="49" charset="0"/>
+              </a:rPr>
+              <a:t> </a:t>
+            </a:r>
+            <a:r>
+              <a:rPr lang="en" sz="1400" b="1" i="0" u="none" strike="noStrike" dirty="0">
+                <a:solidFill>
+                  <a:srgbClr val="00B0F0"/>
+                </a:solidFill>
+                <a:effectLst/>
+                <a:latin typeface="Menlo" panose="020B0609030804020204" pitchFamily="49" charset="0"/>
+              </a:rPr>
+              <a:t>in</a:t>
+            </a:r>
+            <a:r>
+              <a:rPr lang="en" sz="1400" b="0" i="0" u="none" strike="noStrike" dirty="0">
+                <a:solidFill>
+                  <a:srgbClr val="00B0F0"/>
+                </a:solidFill>
+                <a:effectLst/>
+                <a:latin typeface="Menlo" panose="020B0609030804020204" pitchFamily="49" charset="0"/>
+              </a:rPr>
+              <a:t> $(git ls-files -om --exclude-from=.</a:t>
+            </a:r>
+            <a:r>
+              <a:rPr lang="en" sz="1400" b="0" i="0" u="none" strike="noStrike" dirty="0" err="1">
+                <a:solidFill>
+                  <a:srgbClr val="00B0F0"/>
+                </a:solidFill>
+                <a:effectLst/>
+                <a:latin typeface="Menlo" panose="020B0609030804020204" pitchFamily="49" charset="0"/>
+              </a:rPr>
+              <a:t>gitignore</a:t>
+            </a:r>
+            <a:r>
+              <a:rPr lang="en" sz="1400" b="0" i="0" u="none" strike="noStrike" dirty="0">
+                <a:solidFill>
+                  <a:srgbClr val="00B0F0"/>
+                </a:solidFill>
+                <a:effectLst/>
+                <a:latin typeface="Menlo" panose="020B0609030804020204" pitchFamily="49" charset="0"/>
+              </a:rPr>
+              <a:t> | grep ".swift$"); </a:t>
+            </a:r>
+            <a:r>
+              <a:rPr lang="en" sz="1400" b="1" i="0" u="none" strike="noStrike" dirty="0">
+                <a:solidFill>
+                  <a:srgbClr val="00B0F0"/>
+                </a:solidFill>
+                <a:effectLst/>
+                <a:latin typeface="Menlo" panose="020B0609030804020204" pitchFamily="49" charset="0"/>
+              </a:rPr>
+              <a:t>do</a:t>
+            </a:r>
+            <a:r>
+              <a:rPr lang="en" sz="1400" b="0" i="0" u="none" strike="noStrike" dirty="0">
+                <a:solidFill>
+                  <a:srgbClr val="00B0F0"/>
+                </a:solidFill>
+                <a:effectLst/>
+                <a:latin typeface="Menlo" panose="020B0609030804020204" pitchFamily="49" charset="0"/>
+              </a:rPr>
+              <a:t> </a:t>
+            </a:r>
+            <a:endParaRPr lang="ru-RU" sz="1400" b="0" i="0" u="none" strike="noStrike" dirty="0">
+              <a:solidFill>
+                <a:srgbClr val="00B0F0"/>
+              </a:solidFill>
+              <a:effectLst/>
+              <a:latin typeface="Menlo" panose="020B0609030804020204" pitchFamily="49" charset="0"/>
+            </a:endParaRPr>
+          </a:p>
+          <a:p>
+            <a:pPr marL="914400" lvl="2" indent="0">
+              <a:buNone/>
+            </a:pPr>
+            <a:r>
+              <a:rPr lang="ru-RU" sz="1400" b="0" i="0" u="none" strike="noStrike" dirty="0">
+                <a:solidFill>
+                  <a:srgbClr val="00B0F0"/>
+                </a:solidFill>
+                <a:effectLst/>
+                <a:latin typeface="Menlo" panose="020B0609030804020204" pitchFamily="49" charset="0"/>
+              </a:rPr>
+              <a:t>	</a:t>
+            </a:r>
+            <a:r>
+              <a:rPr lang="en" sz="1400" b="0" i="0" u="none" strike="noStrike" dirty="0">
+                <a:solidFill>
+                  <a:srgbClr val="00B0F0"/>
+                </a:solidFill>
+                <a:effectLst/>
+                <a:latin typeface="Menlo" panose="020B0609030804020204" pitchFamily="49" charset="0"/>
+              </a:rPr>
+              <a:t>export </a:t>
+            </a:r>
+            <a:r>
+              <a:rPr lang="en" sz="1400" b="0" i="0" u="none" strike="noStrike" dirty="0" err="1">
+                <a:solidFill>
+                  <a:srgbClr val="00B0F0"/>
+                </a:solidFill>
+                <a:effectLst/>
+                <a:latin typeface="Menlo" panose="020B0609030804020204" pitchFamily="49" charset="0"/>
+              </a:rPr>
+              <a:t>SCRIPT_INPUT_FILE_$count</a:t>
+            </a:r>
+            <a:r>
+              <a:rPr lang="en" sz="1400" b="0" i="0" u="none" strike="noStrike" dirty="0">
+                <a:solidFill>
+                  <a:srgbClr val="00B0F0"/>
+                </a:solidFill>
+                <a:effectLst/>
+                <a:latin typeface="Menlo" panose="020B0609030804020204" pitchFamily="49" charset="0"/>
+              </a:rPr>
+              <a:t>=$</a:t>
+            </a:r>
+            <a:r>
+              <a:rPr lang="en" sz="1400" b="0" i="0" u="none" strike="noStrike" dirty="0" err="1">
+                <a:solidFill>
+                  <a:srgbClr val="00B0F0"/>
+                </a:solidFill>
+                <a:effectLst/>
+                <a:latin typeface="Menlo" panose="020B0609030804020204" pitchFamily="49" charset="0"/>
+              </a:rPr>
+              <a:t>file_path</a:t>
+            </a:r>
+            <a:r>
+              <a:rPr lang="en" sz="1400" b="0" i="0" u="none" strike="noStrike" dirty="0">
+                <a:solidFill>
+                  <a:srgbClr val="00B0F0"/>
+                </a:solidFill>
+                <a:effectLst/>
+                <a:latin typeface="Menlo" panose="020B0609030804020204" pitchFamily="49" charset="0"/>
+              </a:rPr>
+              <a:t> </a:t>
+            </a:r>
+            <a:endParaRPr lang="ru-RU" sz="1400" b="0" i="0" u="none" strike="noStrike" dirty="0">
+              <a:solidFill>
+                <a:srgbClr val="00B0F0"/>
+              </a:solidFill>
+              <a:effectLst/>
+              <a:latin typeface="Menlo" panose="020B0609030804020204" pitchFamily="49" charset="0"/>
+            </a:endParaRPr>
+          </a:p>
+          <a:p>
+            <a:pPr marL="914400" lvl="2" indent="0">
+              <a:buNone/>
+            </a:pPr>
+            <a:r>
+              <a:rPr lang="ru-RU" sz="1400" dirty="0">
+                <a:solidFill>
+                  <a:srgbClr val="00B0F0"/>
+                </a:solidFill>
+                <a:latin typeface="Menlo" panose="020B0609030804020204" pitchFamily="49" charset="0"/>
+              </a:rPr>
+              <a:t>	</a:t>
+            </a:r>
+            <a:r>
+              <a:rPr lang="en" sz="1400" b="0" i="0" u="none" strike="noStrike" dirty="0">
+                <a:solidFill>
+                  <a:srgbClr val="00B0F0"/>
+                </a:solidFill>
+                <a:effectLst/>
+                <a:latin typeface="Menlo" panose="020B0609030804020204" pitchFamily="49" charset="0"/>
+              </a:rPr>
+              <a:t>count=$((count + 1)) </a:t>
+            </a:r>
+            <a:endParaRPr lang="ru-RU" sz="1400" b="0" i="0" u="none" strike="noStrike" dirty="0">
+              <a:solidFill>
+                <a:srgbClr val="00B0F0"/>
+              </a:solidFill>
+              <a:effectLst/>
+              <a:latin typeface="Menlo" panose="020B0609030804020204" pitchFamily="49" charset="0"/>
+            </a:endParaRPr>
+          </a:p>
+          <a:p>
+            <a:pPr marL="914400" lvl="2" indent="0">
+              <a:buNone/>
+            </a:pPr>
+            <a:r>
+              <a:rPr lang="en" sz="1400" b="1" i="0" u="none" strike="noStrike" dirty="0">
+                <a:solidFill>
+                  <a:srgbClr val="00B0F0"/>
+                </a:solidFill>
+                <a:effectLst/>
+                <a:latin typeface="Menlo" panose="020B0609030804020204" pitchFamily="49" charset="0"/>
+              </a:rPr>
+              <a:t>done</a:t>
+            </a:r>
+            <a:r>
+              <a:rPr lang="en" sz="1400" b="0" i="0" u="none" strike="noStrike" dirty="0">
+                <a:solidFill>
+                  <a:srgbClr val="00B0F0"/>
+                </a:solidFill>
+                <a:effectLst/>
+                <a:latin typeface="Menlo" panose="020B0609030804020204" pitchFamily="49" charset="0"/>
+              </a:rPr>
+              <a:t> </a:t>
+            </a:r>
+            <a:endParaRPr lang="ru-RU" sz="1400" b="0" i="0" u="none" strike="noStrike" dirty="0">
+              <a:solidFill>
+                <a:srgbClr val="00B0F0"/>
+              </a:solidFill>
+              <a:effectLst/>
+              <a:latin typeface="Menlo" panose="020B0609030804020204" pitchFamily="49" charset="0"/>
+            </a:endParaRPr>
+          </a:p>
+          <a:p>
+            <a:pPr marL="914400" lvl="2" indent="0">
+              <a:buNone/>
+            </a:pPr>
+            <a:r>
+              <a:rPr lang="en" sz="1400" b="1" i="0" u="none" strike="noStrike" dirty="0">
+                <a:solidFill>
+                  <a:srgbClr val="00B0F0"/>
+                </a:solidFill>
+                <a:effectLst/>
+                <a:latin typeface="Menlo" panose="020B0609030804020204" pitchFamily="49" charset="0"/>
+              </a:rPr>
+              <a:t>for</a:t>
+            </a:r>
+            <a:r>
+              <a:rPr lang="en" sz="1400" b="0" i="0" u="none" strike="noStrike" dirty="0">
+                <a:solidFill>
+                  <a:srgbClr val="00B0F0"/>
+                </a:solidFill>
+                <a:effectLst/>
+                <a:latin typeface="Menlo" panose="020B0609030804020204" pitchFamily="49" charset="0"/>
+              </a:rPr>
+              <a:t> </a:t>
+            </a:r>
+            <a:r>
+              <a:rPr lang="en" sz="1400" b="0" i="0" u="none" strike="noStrike" dirty="0" err="1">
+                <a:solidFill>
+                  <a:srgbClr val="00B0F0"/>
+                </a:solidFill>
+                <a:effectLst/>
+                <a:latin typeface="Menlo" panose="020B0609030804020204" pitchFamily="49" charset="0"/>
+              </a:rPr>
+              <a:t>file_path</a:t>
+            </a:r>
+            <a:r>
+              <a:rPr lang="en" sz="1400" b="0" i="0" u="none" strike="noStrike" dirty="0">
+                <a:solidFill>
+                  <a:srgbClr val="00B0F0"/>
+                </a:solidFill>
+                <a:effectLst/>
+                <a:latin typeface="Menlo" panose="020B0609030804020204" pitchFamily="49" charset="0"/>
+              </a:rPr>
+              <a:t> </a:t>
+            </a:r>
+            <a:r>
+              <a:rPr lang="en" sz="1400" b="1" i="0" u="none" strike="noStrike" dirty="0">
+                <a:solidFill>
+                  <a:srgbClr val="00B0F0"/>
+                </a:solidFill>
+                <a:effectLst/>
+                <a:latin typeface="Menlo" panose="020B0609030804020204" pitchFamily="49" charset="0"/>
+              </a:rPr>
+              <a:t>in</a:t>
+            </a:r>
+            <a:r>
+              <a:rPr lang="en" sz="1400" b="0" i="0" u="none" strike="noStrike" dirty="0">
+                <a:solidFill>
+                  <a:srgbClr val="00B0F0"/>
+                </a:solidFill>
+                <a:effectLst/>
+                <a:latin typeface="Menlo" panose="020B0609030804020204" pitchFamily="49" charset="0"/>
+              </a:rPr>
+              <a:t> $(git diff --cached --name-only | grep ".swift$"); </a:t>
+            </a:r>
+            <a:r>
+              <a:rPr lang="en" sz="1400" b="1" i="0" u="none" strike="noStrike" dirty="0">
+                <a:solidFill>
+                  <a:srgbClr val="00B0F0"/>
+                </a:solidFill>
+                <a:effectLst/>
+                <a:latin typeface="Menlo" panose="020B0609030804020204" pitchFamily="49" charset="0"/>
+              </a:rPr>
+              <a:t>do</a:t>
+            </a:r>
+            <a:r>
+              <a:rPr lang="en" sz="1400" b="0" i="0" u="none" strike="noStrike" dirty="0">
+                <a:solidFill>
+                  <a:srgbClr val="00B0F0"/>
+                </a:solidFill>
+                <a:effectLst/>
+                <a:latin typeface="Menlo" panose="020B0609030804020204" pitchFamily="49" charset="0"/>
+              </a:rPr>
+              <a:t> </a:t>
+            </a:r>
+            <a:endParaRPr lang="ru-RU" sz="1400" b="0" i="0" u="none" strike="noStrike" dirty="0">
+              <a:solidFill>
+                <a:srgbClr val="00B0F0"/>
+              </a:solidFill>
+              <a:effectLst/>
+              <a:latin typeface="Menlo" panose="020B0609030804020204" pitchFamily="49" charset="0"/>
+            </a:endParaRPr>
+          </a:p>
+          <a:p>
+            <a:pPr marL="914400" lvl="2" indent="0">
+              <a:buNone/>
+            </a:pPr>
+            <a:r>
+              <a:rPr lang="ru-RU" sz="1400" dirty="0">
+                <a:solidFill>
+                  <a:srgbClr val="00B0F0"/>
+                </a:solidFill>
+                <a:latin typeface="Menlo" panose="020B0609030804020204" pitchFamily="49" charset="0"/>
+              </a:rPr>
+              <a:t>	</a:t>
+            </a:r>
+            <a:r>
+              <a:rPr lang="en" sz="1400" b="0" i="0" u="none" strike="noStrike" dirty="0">
+                <a:solidFill>
+                  <a:srgbClr val="00B0F0"/>
+                </a:solidFill>
+                <a:effectLst/>
+                <a:latin typeface="Menlo" panose="020B0609030804020204" pitchFamily="49" charset="0"/>
+              </a:rPr>
+              <a:t>export </a:t>
+            </a:r>
+            <a:r>
+              <a:rPr lang="en" sz="1400" b="0" i="0" u="none" strike="noStrike" dirty="0" err="1">
+                <a:solidFill>
+                  <a:srgbClr val="00B0F0"/>
+                </a:solidFill>
+                <a:effectLst/>
+                <a:latin typeface="Menlo" panose="020B0609030804020204" pitchFamily="49" charset="0"/>
+              </a:rPr>
+              <a:t>SCRIPT_INPUT_FILE_$count</a:t>
+            </a:r>
+            <a:r>
+              <a:rPr lang="en" sz="1400" b="0" i="0" u="none" strike="noStrike" dirty="0">
+                <a:solidFill>
+                  <a:srgbClr val="00B0F0"/>
+                </a:solidFill>
+                <a:effectLst/>
+                <a:latin typeface="Menlo" panose="020B0609030804020204" pitchFamily="49" charset="0"/>
+              </a:rPr>
+              <a:t>=$</a:t>
+            </a:r>
+            <a:r>
+              <a:rPr lang="en" sz="1400" b="0" i="0" u="none" strike="noStrike" dirty="0" err="1">
+                <a:solidFill>
+                  <a:srgbClr val="00B0F0"/>
+                </a:solidFill>
+                <a:effectLst/>
+                <a:latin typeface="Menlo" panose="020B0609030804020204" pitchFamily="49" charset="0"/>
+              </a:rPr>
+              <a:t>file_path</a:t>
+            </a:r>
+            <a:r>
+              <a:rPr lang="en" sz="1400" b="0" i="0" u="none" strike="noStrike" dirty="0">
+                <a:solidFill>
+                  <a:srgbClr val="00B0F0"/>
+                </a:solidFill>
+                <a:effectLst/>
+                <a:latin typeface="Menlo" panose="020B0609030804020204" pitchFamily="49" charset="0"/>
+              </a:rPr>
+              <a:t> </a:t>
+            </a:r>
+            <a:endParaRPr lang="ru-RU" sz="1400" b="0" i="0" u="none" strike="noStrike" dirty="0">
+              <a:solidFill>
+                <a:srgbClr val="00B0F0"/>
+              </a:solidFill>
+              <a:effectLst/>
+              <a:latin typeface="Menlo" panose="020B0609030804020204" pitchFamily="49" charset="0"/>
+            </a:endParaRPr>
+          </a:p>
+          <a:p>
+            <a:pPr marL="914400" lvl="2" indent="0">
+              <a:buNone/>
+            </a:pPr>
+            <a:r>
+              <a:rPr lang="ru-RU" sz="1400" dirty="0">
+                <a:solidFill>
+                  <a:srgbClr val="00B0F0"/>
+                </a:solidFill>
+                <a:latin typeface="Menlo" panose="020B0609030804020204" pitchFamily="49" charset="0"/>
+              </a:rPr>
+              <a:t>	</a:t>
+            </a:r>
+            <a:r>
+              <a:rPr lang="en" sz="1400" b="0" i="0" u="none" strike="noStrike" dirty="0">
+                <a:solidFill>
+                  <a:srgbClr val="00B0F0"/>
+                </a:solidFill>
+                <a:effectLst/>
+                <a:latin typeface="Menlo" panose="020B0609030804020204" pitchFamily="49" charset="0"/>
+              </a:rPr>
+              <a:t>count=$((count + 1)) </a:t>
+            </a:r>
+            <a:endParaRPr lang="ru-RU" sz="1400" b="0" i="0" u="none" strike="noStrike" dirty="0">
+              <a:solidFill>
+                <a:srgbClr val="00B0F0"/>
+              </a:solidFill>
+              <a:effectLst/>
+              <a:latin typeface="Menlo" panose="020B0609030804020204" pitchFamily="49" charset="0"/>
+            </a:endParaRPr>
+          </a:p>
+          <a:p>
+            <a:pPr marL="914400" lvl="2" indent="0">
+              <a:buNone/>
+            </a:pPr>
+            <a:r>
+              <a:rPr lang="en" sz="1400" b="1" i="0" u="none" strike="noStrike" dirty="0">
+                <a:solidFill>
+                  <a:srgbClr val="00B0F0"/>
+                </a:solidFill>
+                <a:effectLst/>
+                <a:latin typeface="Menlo" panose="020B0609030804020204" pitchFamily="49" charset="0"/>
+              </a:rPr>
+              <a:t>done</a:t>
+            </a:r>
+            <a:r>
+              <a:rPr lang="en" sz="1400" b="0" i="0" u="none" strike="noStrike" dirty="0">
+                <a:solidFill>
+                  <a:srgbClr val="00B0F0"/>
+                </a:solidFill>
+                <a:effectLst/>
+                <a:latin typeface="Menlo" panose="020B0609030804020204" pitchFamily="49" charset="0"/>
+              </a:rPr>
+              <a:t> </a:t>
+            </a:r>
+            <a:endParaRPr lang="ru-RU" sz="1400" b="0" i="0" u="none" strike="noStrike" dirty="0">
+              <a:solidFill>
+                <a:srgbClr val="00B0F0"/>
+              </a:solidFill>
+              <a:effectLst/>
+              <a:latin typeface="Menlo" panose="020B0609030804020204" pitchFamily="49" charset="0"/>
+            </a:endParaRPr>
+          </a:p>
+          <a:p>
+            <a:pPr marL="914400" lvl="2" indent="0">
+              <a:buNone/>
+            </a:pPr>
+            <a:r>
+              <a:rPr lang="ru-RU" sz="1400" dirty="0">
+                <a:solidFill>
+                  <a:srgbClr val="00B0F0"/>
+                </a:solidFill>
+                <a:latin typeface="Menlo" panose="020B0609030804020204" pitchFamily="49" charset="0"/>
+              </a:rPr>
+              <a:t>	</a:t>
+            </a:r>
+            <a:r>
+              <a:rPr lang="en" sz="1400" b="0" i="0" u="none" strike="noStrike" dirty="0">
+                <a:solidFill>
+                  <a:srgbClr val="00B0F0"/>
+                </a:solidFill>
+                <a:effectLst/>
+                <a:latin typeface="Menlo" panose="020B0609030804020204" pitchFamily="49" charset="0"/>
+              </a:rPr>
+              <a:t>export SCRIPT_INPUT_FILE_COUNT=$count </a:t>
+            </a:r>
+            <a:endParaRPr lang="ru-RU" sz="1400" b="0" i="0" u="none" strike="noStrike" dirty="0">
+              <a:solidFill>
+                <a:srgbClr val="00B0F0"/>
+              </a:solidFill>
+              <a:effectLst/>
+              <a:latin typeface="Menlo" panose="020B0609030804020204" pitchFamily="49" charset="0"/>
+            </a:endParaRPr>
+          </a:p>
+          <a:p>
+            <a:pPr marL="914400" lvl="2" indent="0">
+              <a:buNone/>
+            </a:pPr>
+            <a:r>
+              <a:rPr lang="ru-RU" sz="1400" b="0" i="0" u="none" strike="noStrike" dirty="0">
+                <a:solidFill>
+                  <a:srgbClr val="00B0F0"/>
+                </a:solidFill>
+                <a:effectLst/>
+                <a:latin typeface="Menlo" panose="020B0609030804020204" pitchFamily="49" charset="0"/>
+              </a:rPr>
+              <a:t>	</a:t>
+            </a:r>
+            <a:r>
+              <a:rPr lang="en" sz="1400" b="0" i="0" u="none" strike="noStrike" dirty="0" err="1">
+                <a:solidFill>
+                  <a:srgbClr val="00B0F0"/>
+                </a:solidFill>
+                <a:effectLst/>
+                <a:latin typeface="Menlo" panose="020B0609030804020204" pitchFamily="49" charset="0"/>
+              </a:rPr>
+              <a:t>swiftlint</a:t>
+            </a:r>
+            <a:r>
+              <a:rPr lang="en" sz="1400" b="0" i="0" u="none" strike="noStrike" dirty="0">
+                <a:solidFill>
+                  <a:srgbClr val="00B0F0"/>
+                </a:solidFill>
+                <a:effectLst/>
+                <a:latin typeface="Menlo" panose="020B0609030804020204" pitchFamily="49" charset="0"/>
+              </a:rPr>
+              <a:t> lint --use-script-input-files</a:t>
+            </a:r>
+            <a:endParaRPr lang="ru-RU" sz="1400" dirty="0">
+              <a:solidFill>
+                <a:srgbClr val="00B0F0"/>
+              </a:solidFill>
+            </a:endParaRPr>
+          </a:p>
+          <a:p>
+            <a:pPr lvl="1"/>
+            <a:endParaRPr lang="ru-RU" dirty="0"/>
+          </a:p>
+        </p:txBody>
+      </p:sp>
+    </p:spTree>
+    <p:extLst>
+      <p:ext uri="{BB962C8B-B14F-4D97-AF65-F5344CB8AC3E}">
+        <p14:creationId xmlns:p14="http://schemas.microsoft.com/office/powerpoint/2010/main" val="2819899561"/>
+      </p:ext>
+    </p:extLst>
+  </p:cSld>
+  <p:clrMapOvr>
+    <a:masterClrMapping/>
+  </p:clrMapOvr>
+</p:sld>
+</file>
+
+<file path=ppt/slides/slide12.xml><?xml version="1.0" encoding="utf-8"?>
+<p:sld xmlns:a="http://schemas.openxmlformats.org/drawingml/2006/main" xmlns:r="http://schemas.openxmlformats.org/officeDocument/2006/relationships" xmlns:p="http://schemas.openxmlformats.org/presentationml/2006/main">
+  <p:cSld>
+    <p:spTree>
+      <p:nvGrpSpPr>
+        <p:cNvPr id="1" name=""/>
+        <p:cNvGrpSpPr/>
+        <p:nvPr/>
+      </p:nvGrpSpPr>
+      <p:grpSpPr>
+        <a:xfrm>
+          <a:off x="0" y="0"/>
+          <a:ext cx="0" cy="0"/>
+          <a:chOff x="0" y="0"/>
+          <a:chExt cx="0" cy="0"/>
+        </a:xfrm>
+      </p:grpSpPr>
+      <p:sp>
+        <p:nvSpPr>
+          <p:cNvPr id="2" name="Заголовок 1">
+            <a:extLst>
+              <a:ext uri="{FF2B5EF4-FFF2-40B4-BE49-F238E27FC236}">
+                <a16:creationId xmlns:a16="http://schemas.microsoft.com/office/drawing/2014/main" id="{31B897F7-0DCF-E745-B78C-D400FE6E3D18}"/>
+              </a:ext>
+            </a:extLst>
+          </p:cNvPr>
+          <p:cNvSpPr>
+            <a:spLocks noGrp="1"/>
+          </p:cNvSpPr>
+          <p:nvPr>
+            <p:ph type="title"/>
+          </p:nvPr>
+        </p:nvSpPr>
+        <p:spPr/>
+        <p:txBody>
+          <a:bodyPr/>
+          <a:lstStyle/>
+          <a:p>
+            <a:r>
+              <a:rPr lang="ru-RU" dirty="0">
+                <a:solidFill>
+                  <a:srgbClr val="7030A0"/>
+                </a:solidFill>
+              </a:rPr>
+              <a:t>Итог</a:t>
+            </a:r>
+          </a:p>
+        </p:txBody>
+      </p:sp>
+      <p:sp>
+        <p:nvSpPr>
+          <p:cNvPr id="3" name="Объект 2">
+            <a:extLst>
+              <a:ext uri="{FF2B5EF4-FFF2-40B4-BE49-F238E27FC236}">
+                <a16:creationId xmlns:a16="http://schemas.microsoft.com/office/drawing/2014/main" id="{65F95F4C-C842-E64F-9E8C-3F671E7857A7}"/>
+              </a:ext>
+            </a:extLst>
+          </p:cNvPr>
+          <p:cNvSpPr>
+            <a:spLocks noGrp="1"/>
+          </p:cNvSpPr>
+          <p:nvPr>
+            <p:ph idx="1"/>
+          </p:nvPr>
+        </p:nvSpPr>
+        <p:spPr/>
+        <p:txBody>
+          <a:bodyPr/>
+          <a:lstStyle/>
+          <a:p>
+            <a:r>
+              <a:rPr lang="en-US" dirty="0" err="1">
+                <a:solidFill>
+                  <a:srgbClr val="FFFF00"/>
+                </a:solidFill>
+              </a:rPr>
+              <a:t>SwiftLint</a:t>
+            </a:r>
+            <a:r>
+              <a:rPr lang="en-US" dirty="0">
+                <a:solidFill>
+                  <a:srgbClr val="FFFF00"/>
+                </a:solidFill>
+              </a:rPr>
+              <a:t> </a:t>
+            </a:r>
+            <a:r>
+              <a:rPr lang="ru-RU" dirty="0">
+                <a:solidFill>
+                  <a:srgbClr val="FFFF00"/>
+                </a:solidFill>
+              </a:rPr>
+              <a:t>нужен</a:t>
+            </a:r>
+            <a:r>
+              <a:rPr lang="ru-RU" dirty="0"/>
+              <a:t> для того, чтобы</a:t>
+            </a:r>
+            <a:r>
+              <a:rPr lang="en-US" dirty="0"/>
+              <a:t>:</a:t>
+            </a:r>
+          </a:p>
+          <a:p>
+            <a:pPr marL="457200" lvl="1" indent="0">
+              <a:buNone/>
+            </a:pPr>
+            <a:r>
+              <a:rPr lang="en-US" dirty="0"/>
+              <a:t>	1) </a:t>
+            </a:r>
+            <a:r>
+              <a:rPr lang="ru-RU" dirty="0">
+                <a:solidFill>
+                  <a:srgbClr val="FFFF00"/>
+                </a:solidFill>
+              </a:rPr>
+              <a:t>Тратить меньше времени на код-</a:t>
+            </a:r>
+            <a:r>
+              <a:rPr lang="ru-RU" dirty="0" err="1">
+                <a:solidFill>
+                  <a:srgbClr val="FFFF00"/>
+                </a:solidFill>
+              </a:rPr>
+              <a:t>ревью</a:t>
+            </a:r>
+            <a:r>
+              <a:rPr lang="ru-RU" dirty="0"/>
+              <a:t> при работе в команде, над объемными проектами</a:t>
+            </a:r>
+          </a:p>
+          <a:p>
+            <a:pPr marL="457200" lvl="1" indent="0">
+              <a:buNone/>
+            </a:pPr>
+            <a:r>
+              <a:rPr lang="ru-RU" dirty="0"/>
+              <a:t>	2) </a:t>
+            </a:r>
+            <a:r>
+              <a:rPr lang="ru-RU" dirty="0">
+                <a:solidFill>
+                  <a:srgbClr val="FFFF00"/>
+                </a:solidFill>
+              </a:rPr>
+              <a:t>Придерживаться единого </a:t>
+            </a:r>
+            <a:r>
+              <a:rPr lang="en" dirty="0">
+                <a:solidFill>
+                  <a:srgbClr val="FFFF00"/>
+                </a:solidFill>
+              </a:rPr>
+              <a:t>Code Style</a:t>
+            </a:r>
+          </a:p>
+          <a:p>
+            <a:pPr marL="457200" lvl="1" indent="0">
+              <a:buNone/>
+            </a:pPr>
+            <a:r>
+              <a:rPr lang="en" dirty="0">
+                <a:solidFill>
+                  <a:srgbClr val="FFFF00"/>
+                </a:solidFill>
+              </a:rPr>
+              <a:t>	</a:t>
+            </a:r>
+            <a:r>
+              <a:rPr lang="en" dirty="0"/>
+              <a:t>3) </a:t>
+            </a:r>
+            <a:r>
+              <a:rPr lang="ru-RU" dirty="0">
+                <a:solidFill>
+                  <a:srgbClr val="FFFF00"/>
+                </a:solidFill>
+              </a:rPr>
+              <a:t>Повысить качество кода</a:t>
+            </a:r>
+          </a:p>
+        </p:txBody>
+      </p:sp>
+    </p:spTree>
+    <p:extLst>
+      <p:ext uri="{BB962C8B-B14F-4D97-AF65-F5344CB8AC3E}">
+        <p14:creationId xmlns:p14="http://schemas.microsoft.com/office/powerpoint/2010/main" val="1600230655"/>
+      </p:ext>
+    </p:extLst>
+  </p:cSld>
+  <p:clrMapOvr>
+    <a:masterClrMapping/>
+  </p:clrMapOvr>
+</p:sld>
+</file>
+
+<file path=ppt/slides/slide13.xml><?xml version="1.0" encoding="utf-8"?>
+<p:sld xmlns:a="http://schemas.openxmlformats.org/drawingml/2006/main" xmlns:r="http://schemas.openxmlformats.org/officeDocument/2006/relationships" xmlns:p="http://schemas.openxmlformats.org/presentationml/2006/main">
+  <p:cSld>
+    <p:spTree>
+      <p:nvGrpSpPr>
+        <p:cNvPr id="1" name=""/>
+        <p:cNvGrpSpPr/>
+        <p:nvPr/>
+      </p:nvGrpSpPr>
+      <p:grpSpPr>
+        <a:xfrm>
+          <a:off x="0" y="0"/>
+          <a:ext cx="0" cy="0"/>
+          <a:chOff x="0" y="0"/>
+          <a:chExt cx="0" cy="0"/>
+        </a:xfrm>
+      </p:grpSpPr>
+      <p:sp>
+        <p:nvSpPr>
+          <p:cNvPr id="2" name="Заголовок 1">
+            <a:extLst>
+              <a:ext uri="{FF2B5EF4-FFF2-40B4-BE49-F238E27FC236}">
                 <a16:creationId xmlns:a16="http://schemas.microsoft.com/office/drawing/2014/main" id="{875CFA3B-F0CB-B648-8DC8-A215511A3078}"/>
               </a:ext>
             </a:extLst>
@@ -3549,7 +4853,7 @@
 </p:sld>
 </file>
 
-<file path=ppt/slides/slide12.xml><?xml version="1.0" encoding="utf-8"?>
+<file path=ppt/slides/slide14.xml><?xml version="1.0" encoding="utf-8"?>
 <p:sld xmlns:a="http://schemas.openxmlformats.org/drawingml/2006/main" xmlns:r="http://schemas.openxmlformats.org/officeDocument/2006/relationships" xmlns:p="http://schemas.openxmlformats.org/presentationml/2006/main">
   <p:cSld>
     <p:spTree>
@@ -6151,7 +7455,7 @@
           <p:cNvPr id="2" name="Заголовок 1">
             <a:extLst>
               <a:ext uri="{FF2B5EF4-FFF2-40B4-BE49-F238E27FC236}">
-                <a16:creationId xmlns:a16="http://schemas.microsoft.com/office/drawing/2014/main" id="{35C301BA-129E-DF40-8C2E-045766D13E8F}"/>
+                <a16:creationId xmlns:a16="http://schemas.microsoft.com/office/drawing/2014/main" id="{44D3ACDE-4113-2042-8870-1A819B5D827F}"/>
               </a:ext>
             </a:extLst>
           </p:cNvPr>
@@ -6167,7 +7471,14 @@
           <a:bodyPr/>
           <a:lstStyle/>
           <a:p>
-            <a:endParaRPr lang="ru-RU"/>
+            <a:r>
+              <a:rPr lang="ru-RU" dirty="0">
+                <a:solidFill>
+                  <a:srgbClr val="7030A0"/>
+                </a:solidFill>
+              </a:rPr>
+              <a:t>Конфигурация (настройка правил)</a:t>
+            </a:r>
           </a:p>
         </p:txBody>
       </p:sp>
@@ -6176,7 +7487,7 @@
           <p:cNvPr id="3" name="Объект 2">
             <a:extLst>
               <a:ext uri="{FF2B5EF4-FFF2-40B4-BE49-F238E27FC236}">
-                <a16:creationId xmlns:a16="http://schemas.microsoft.com/office/drawing/2014/main" id="{54265279-91D8-144C-80DC-66B43F3940D5}"/>
+                <a16:creationId xmlns:a16="http://schemas.microsoft.com/office/drawing/2014/main" id="{F6840327-ECB1-CD44-AFF2-38C26E734B1E}"/>
               </a:ext>
             </a:extLst>
           </p:cNvPr>
@@ -6189,17 +7500,122 @@
         </p:nvSpPr>
         <p:spPr/>
         <p:txBody>
-          <a:bodyPr/>
+          <a:bodyPr>
+            <a:normAutofit/>
+          </a:bodyPr>
           <a:lstStyle/>
           <a:p>
-            <a:endParaRPr lang="ru-RU"/>
+            <a:r>
+              <a:rPr lang="ru-RU" b="0" i="0" u="none" strike="noStrike" dirty="0">
+                <a:effectLst/>
+              </a:rPr>
+              <a:t>Для того </a:t>
+            </a:r>
+            <a:r>
+              <a:rPr lang="ru-RU" dirty="0"/>
+              <a:t>чтобы </a:t>
+            </a:r>
+            <a:r>
+              <a:rPr lang="ru-RU" b="0" i="0" u="none" strike="noStrike" dirty="0">
+                <a:solidFill>
+                  <a:srgbClr val="FFFF00"/>
+                </a:solidFill>
+                <a:effectLst/>
+              </a:rPr>
+              <a:t>отключить, настроить</a:t>
+            </a:r>
+            <a:r>
+              <a:rPr lang="ru-RU" b="0" i="0" u="none" strike="noStrike" dirty="0">
+                <a:effectLst/>
+              </a:rPr>
+              <a:t> или </a:t>
+            </a:r>
+            <a:r>
+              <a:rPr lang="ru-RU" b="0" i="0" u="none" strike="noStrike" dirty="0">
+                <a:solidFill>
+                  <a:srgbClr val="FFFF00"/>
+                </a:solidFill>
+                <a:effectLst/>
+              </a:rPr>
+              <a:t>добавить</a:t>
+            </a:r>
+            <a:r>
+              <a:rPr lang="ru-RU" b="0" i="0" u="none" strike="noStrike" dirty="0">
+                <a:effectLst/>
+              </a:rPr>
+              <a:t> какие-либо правила необходимо </a:t>
+            </a:r>
+            <a:r>
+              <a:rPr lang="ru-RU" b="0" i="0" u="none" strike="noStrike" dirty="0">
+                <a:solidFill>
+                  <a:srgbClr val="FFFF00"/>
+                </a:solidFill>
+                <a:effectLst/>
+              </a:rPr>
+              <a:t>в корне проекта создать файл .</a:t>
+            </a:r>
+            <a:r>
+              <a:rPr lang="en" b="0" i="0" u="none" strike="noStrike" dirty="0" err="1">
+                <a:solidFill>
+                  <a:srgbClr val="FFFF00"/>
+                </a:solidFill>
+                <a:effectLst/>
+              </a:rPr>
+              <a:t>swiftlint.yml</a:t>
+            </a:r>
+            <a:r>
+              <a:rPr lang="en" dirty="0">
+                <a:solidFill>
+                  <a:srgbClr val="FFFF00"/>
+                </a:solidFill>
+              </a:rPr>
+              <a:t>:</a:t>
+            </a:r>
+          </a:p>
+          <a:p>
+            <a:pPr lvl="1"/>
+            <a:r>
+              <a:rPr lang="en" sz="2000" dirty="0">
+                <a:solidFill>
+                  <a:srgbClr val="00B0F0"/>
+                </a:solidFill>
+              </a:rPr>
+              <a:t>touch </a:t>
+            </a:r>
+            <a:r>
+              <a:rPr lang="en" sz="2000" b="0" i="0" u="none" strike="noStrike" dirty="0">
+                <a:solidFill>
+                  <a:srgbClr val="00B0F0"/>
+                </a:solidFill>
+                <a:effectLst/>
+                <a:latin typeface="-apple-system"/>
+              </a:rPr>
+              <a:t>.</a:t>
+            </a:r>
+            <a:r>
+              <a:rPr lang="en" sz="2000" b="0" i="0" u="none" strike="noStrike" dirty="0" err="1">
+                <a:solidFill>
+                  <a:srgbClr val="00B0F0"/>
+                </a:solidFill>
+                <a:effectLst/>
+                <a:latin typeface="-apple-system"/>
+              </a:rPr>
+              <a:t>swiftlint.yml</a:t>
+            </a:r>
+            <a:endParaRPr lang="en" sz="2000" b="0" i="0" u="none" strike="noStrike" dirty="0">
+              <a:solidFill>
+                <a:srgbClr val="00B0F0"/>
+              </a:solidFill>
+              <a:effectLst/>
+              <a:latin typeface="-apple-system"/>
+            </a:endParaRPr>
           </a:p>
         </p:txBody>
       </p:sp>
     </p:spTree>
     <p:extLst>
       <p:ext uri="{BB962C8B-B14F-4D97-AF65-F5344CB8AC3E}">
-        <p14:creationId xmlns:p14="http://schemas.microsoft.com/office/powerpoint/2010/main" val="3351323573"/>
+        <p14:creationId xmlns:p14="http://schemas.microsoft.com/office/powerpoint/2010/main" val="3880877076"/>
       </p:ext>
     </p:extLst>
   </p:cSld>
@@ -6231,7 +7647,7 @@
           <p:cNvPr id="2" name="Заголовок 1">
             <a:extLst>
               <a:ext uri="{FF2B5EF4-FFF2-40B4-BE49-F238E27FC236}">
-                <a16:creationId xmlns:a16="http://schemas.microsoft.com/office/drawing/2014/main" id="{44D3ACDE-4113-2042-8870-1A819B5D827F}"/>
+                <a16:creationId xmlns:a16="http://schemas.microsoft.com/office/drawing/2014/main" id="{3F677717-05C0-0143-A1AA-7C857E3570EF}"/>
               </a:ext>
             </a:extLst>
           </p:cNvPr>
@@ -6253,7 +7669,7 @@
                   <a:srgbClr val="7030A0"/>
                 </a:solidFill>
               </a:rPr>
-              <a:t>Работа с правилами</a:t>
+              <a:t>Вложенная конфигурация </a:t>
             </a:r>
           </a:p>
         </p:txBody>
@@ -6263,7 +7679,7 @@
           <p:cNvPr id="3" name="Объект 2">
             <a:extLst>
               <a:ext uri="{FF2B5EF4-FFF2-40B4-BE49-F238E27FC236}">
-                <a16:creationId xmlns:a16="http://schemas.microsoft.com/office/drawing/2014/main" id="{F6840327-ECB1-CD44-AFF2-38C26E734B1E}"/>
+                <a16:creationId xmlns:a16="http://schemas.microsoft.com/office/drawing/2014/main" id="{5E72C12A-042A-DB46-B176-23AB4A4C9BC8}"/>
               </a:ext>
             </a:extLst>
           </p:cNvPr>
@@ -6279,14 +7695,128 @@
           <a:bodyPr/>
           <a:lstStyle/>
           <a:p>
-            <a:endParaRPr lang="ru-RU" dirty="0"/>
+            <a:r>
+              <a:rPr lang="ru-RU" b="0" i="0" u="none" strike="noStrike" dirty="0">
+                <a:solidFill>
+                  <a:srgbClr val="FFFF00"/>
+                </a:solidFill>
+                <a:effectLst/>
+                <a:latin typeface="-apple-system"/>
+              </a:rPr>
+              <a:t>Вы можете создавать несколько файлов конфигураций (.</a:t>
+            </a:r>
+            <a:r>
+              <a:rPr lang="en" b="0" i="0" u="none" strike="noStrike" dirty="0" err="1">
+                <a:solidFill>
+                  <a:srgbClr val="FFFF00"/>
+                </a:solidFill>
+                <a:effectLst/>
+                <a:latin typeface="-apple-system"/>
+              </a:rPr>
+              <a:t>swiftlint.yml</a:t>
+            </a:r>
+            <a:r>
+              <a:rPr lang="en" b="0" i="0" u="none" strike="noStrike" dirty="0">
+                <a:solidFill>
+                  <a:srgbClr val="FFFF00"/>
+                </a:solidFill>
+                <a:effectLst/>
+                <a:latin typeface="-apple-system"/>
+              </a:rPr>
+              <a:t>) </a:t>
+            </a:r>
+            <a:r>
+              <a:rPr lang="ru-RU" b="0" i="0" u="none" strike="noStrike" dirty="0">
+                <a:solidFill>
+                  <a:srgbClr val="FFFF00"/>
+                </a:solidFill>
+                <a:effectLst/>
+                <a:latin typeface="-apple-system"/>
+              </a:rPr>
+              <a:t>для различных подкаталогов. </a:t>
+            </a:r>
+            <a:r>
+              <a:rPr lang="en" b="0" i="0" u="none" strike="noStrike" dirty="0" err="1">
+                <a:solidFill>
+                  <a:srgbClr val="FFFF00"/>
+                </a:solidFill>
+                <a:effectLst/>
+                <a:latin typeface="-apple-system"/>
+              </a:rPr>
+              <a:t>SwiftLint</a:t>
+            </a:r>
+            <a:r>
+              <a:rPr lang="en" b="0" i="0" u="none" strike="noStrike" dirty="0">
+                <a:solidFill>
+                  <a:srgbClr val="FFFF00"/>
+                </a:solidFill>
+                <a:effectLst/>
+                <a:latin typeface="-apple-system"/>
+              </a:rPr>
+              <a:t> </a:t>
+            </a:r>
+            <a:r>
+              <a:rPr lang="ru-RU" b="0" i="0" u="none" strike="noStrike" dirty="0">
+                <a:solidFill>
+                  <a:srgbClr val="FFFF00"/>
+                </a:solidFill>
+                <a:effectLst/>
+                <a:latin typeface="-apple-system"/>
+              </a:rPr>
+              <a:t>будет автоматически использовать конфигурацию расположенную в папке с проверяемыми файлами. Параметры </a:t>
+            </a:r>
+            <a:r>
+              <a:rPr lang="en" b="0" i="0" u="none" strike="noStrike" dirty="0">
+                <a:solidFill>
+                  <a:srgbClr val="FFFF00"/>
+                </a:solidFill>
+                <a:effectLst/>
+                <a:latin typeface="-apple-system"/>
+              </a:rPr>
+              <a:t>excluded </a:t>
+            </a:r>
+            <a:r>
+              <a:rPr lang="ru-RU" b="0" i="0" u="none" strike="noStrike" dirty="0">
+                <a:solidFill>
+                  <a:srgbClr val="FFFF00"/>
+                </a:solidFill>
+                <a:effectLst/>
+                <a:latin typeface="-apple-system"/>
+              </a:rPr>
+              <a:t>и </a:t>
+            </a:r>
+            <a:r>
+              <a:rPr lang="en" b="0" i="0" u="none" strike="noStrike" dirty="0">
+                <a:solidFill>
+                  <a:srgbClr val="FFFF00"/>
+                </a:solidFill>
+                <a:effectLst/>
+                <a:latin typeface="-apple-system"/>
+              </a:rPr>
+              <a:t>included </a:t>
+            </a:r>
+            <a:r>
+              <a:rPr lang="ru-RU" b="0" i="0" u="none" strike="noStrike" dirty="0">
+                <a:solidFill>
+                  <a:srgbClr val="FFFF00"/>
+                </a:solidFill>
+                <a:effectLst/>
+                <a:latin typeface="-apple-system"/>
+              </a:rPr>
+              <a:t>для вложенных конфигураций будут игнорироваться.</a:t>
+            </a:r>
+            <a:endParaRPr lang="ru-RU" dirty="0">
+              <a:solidFill>
+                <a:srgbClr val="FFFF00"/>
+              </a:solidFill>
+            </a:endParaRPr>
           </a:p>
         </p:txBody>
       </p:sp>
     </p:spTree>
     <p:extLst>
       <p:ext uri="{BB962C8B-B14F-4D97-AF65-F5344CB8AC3E}">
-        <p14:creationId xmlns:p14="http://schemas.microsoft.com/office/powerpoint/2010/main" val="3880877076"/>
+        <p14:creationId xmlns:p14="http://schemas.microsoft.com/office/powerpoint/2010/main" val="2507960786"/>
       </p:ext>
     </p:extLst>
   </p:cSld>

</xml_diff>